<commit_message>
added Sarah Hilton comments
</commit_message>
<xml_diff>
--- a/paper/figures/dms_schematic/dms_schematic.pptx
+++ b/paper/figures/dms_schematic/dms_schematic.pptx
@@ -106,7 +106,7 @@
   </p:defaultTextStyle>
   <p:extLst>
     <p:ext uri="{EFAFB233-063F-42B5-8137-9DF3F51BA10A}">
-      <p15:sldGuideLst xmlns:p15="http://schemas.microsoft.com/office/powerpoint/2012/main">
+      <p15:sldGuideLst xmlns:p15="http://schemas.microsoft.com/office/powerpoint/2012/main" xmlns="">
         <p15:guide id="1" orient="horz" pos="1239" userDrawn="1">
           <p15:clr>
             <a:srgbClr val="A4A3A4"/>
@@ -304,7 +304,7 @@
           <a:p>
             <a:fld id="{B1E60CEC-8CC6-8B48-9CD4-E19D93CC4CEE}" type="datetimeFigureOut">
               <a:rPr lang="en-US" smtClean="0"/>
-              <a:t>12/1/17</a:t>
+              <a:t>12/12/17</a:t>
             </a:fld>
             <a:endParaRPr lang="en-US"/>
           </a:p>
@@ -474,7 +474,7 @@
           <a:p>
             <a:fld id="{B1E60CEC-8CC6-8B48-9CD4-E19D93CC4CEE}" type="datetimeFigureOut">
               <a:rPr lang="en-US" smtClean="0"/>
-              <a:t>12/1/17</a:t>
+              <a:t>12/12/17</a:t>
             </a:fld>
             <a:endParaRPr lang="en-US"/>
           </a:p>
@@ -654,7 +654,7 @@
           <a:p>
             <a:fld id="{B1E60CEC-8CC6-8B48-9CD4-E19D93CC4CEE}" type="datetimeFigureOut">
               <a:rPr lang="en-US" smtClean="0"/>
-              <a:t>12/1/17</a:t>
+              <a:t>12/12/17</a:t>
             </a:fld>
             <a:endParaRPr lang="en-US"/>
           </a:p>
@@ -824,7 +824,7 @@
           <a:p>
             <a:fld id="{B1E60CEC-8CC6-8B48-9CD4-E19D93CC4CEE}" type="datetimeFigureOut">
               <a:rPr lang="en-US" smtClean="0"/>
-              <a:t>12/1/17</a:t>
+              <a:t>12/12/17</a:t>
             </a:fld>
             <a:endParaRPr lang="en-US"/>
           </a:p>
@@ -1070,7 +1070,7 @@
           <a:p>
             <a:fld id="{B1E60CEC-8CC6-8B48-9CD4-E19D93CC4CEE}" type="datetimeFigureOut">
               <a:rPr lang="en-US" smtClean="0"/>
-              <a:t>12/1/17</a:t>
+              <a:t>12/12/17</a:t>
             </a:fld>
             <a:endParaRPr lang="en-US"/>
           </a:p>
@@ -1358,7 +1358,7 @@
           <a:p>
             <a:fld id="{B1E60CEC-8CC6-8B48-9CD4-E19D93CC4CEE}" type="datetimeFigureOut">
               <a:rPr lang="en-US" smtClean="0"/>
-              <a:t>12/1/17</a:t>
+              <a:t>12/12/17</a:t>
             </a:fld>
             <a:endParaRPr lang="en-US"/>
           </a:p>
@@ -1785,7 +1785,7 @@
           <a:p>
             <a:fld id="{B1E60CEC-8CC6-8B48-9CD4-E19D93CC4CEE}" type="datetimeFigureOut">
               <a:rPr lang="en-US" smtClean="0"/>
-              <a:t>12/1/17</a:t>
+              <a:t>12/12/17</a:t>
             </a:fld>
             <a:endParaRPr lang="en-US"/>
           </a:p>
@@ -1903,7 +1903,7 @@
           <a:p>
             <a:fld id="{B1E60CEC-8CC6-8B48-9CD4-E19D93CC4CEE}" type="datetimeFigureOut">
               <a:rPr lang="en-US" smtClean="0"/>
-              <a:t>12/1/17</a:t>
+              <a:t>12/12/17</a:t>
             </a:fld>
             <a:endParaRPr lang="en-US"/>
           </a:p>
@@ -1998,7 +1998,7 @@
           <a:p>
             <a:fld id="{B1E60CEC-8CC6-8B48-9CD4-E19D93CC4CEE}" type="datetimeFigureOut">
               <a:rPr lang="en-US" smtClean="0"/>
-              <a:t>12/1/17</a:t>
+              <a:t>12/12/17</a:t>
             </a:fld>
             <a:endParaRPr lang="en-US"/>
           </a:p>
@@ -2275,7 +2275,7 @@
           <a:p>
             <a:fld id="{B1E60CEC-8CC6-8B48-9CD4-E19D93CC4CEE}" type="datetimeFigureOut">
               <a:rPr lang="en-US" smtClean="0"/>
-              <a:t>12/1/17</a:t>
+              <a:t>12/12/17</a:t>
             </a:fld>
             <a:endParaRPr lang="en-US"/>
           </a:p>
@@ -2528,7 +2528,7 @@
           <a:p>
             <a:fld id="{B1E60CEC-8CC6-8B48-9CD4-E19D93CC4CEE}" type="datetimeFigureOut">
               <a:rPr lang="en-US" smtClean="0"/>
-              <a:t>12/1/17</a:t>
+              <a:t>12/12/17</a:t>
             </a:fld>
             <a:endParaRPr lang="en-US"/>
           </a:p>
@@ -2741,7 +2741,7 @@
           <a:p>
             <a:fld id="{B1E60CEC-8CC6-8B48-9CD4-E19D93CC4CEE}" type="datetimeFigureOut">
               <a:rPr lang="en-US" smtClean="0"/>
-              <a:t>12/1/17</a:t>
+              <a:t>12/12/17</a:t>
             </a:fld>
             <a:endParaRPr lang="en-US"/>
           </a:p>
@@ -3210,10 +3210,12 @@
               <a:prstGeom prst="ellipse">
                 <a:avLst/>
               </a:prstGeom>
-              <a:grpFill/>
+              <a:solidFill>
+                <a:srgbClr val="008000"/>
+              </a:solidFill>
               <a:ln w="3175" cmpd="sng">
                 <a:solidFill>
-                  <a:schemeClr val="accent2"/>
+                  <a:srgbClr val="008000"/>
                 </a:solidFill>
               </a:ln>
             </p:spPr>
@@ -3259,10 +3261,12 @@
               <a:prstGeom prst="ellipse">
                 <a:avLst/>
               </a:prstGeom>
-              <a:grpFill/>
+              <a:solidFill>
+                <a:srgbClr val="008000"/>
+              </a:solidFill>
               <a:ln w="3175" cmpd="sng">
                 <a:solidFill>
-                  <a:schemeClr val="accent2"/>
+                  <a:srgbClr val="008000"/>
                 </a:solidFill>
               </a:ln>
             </p:spPr>
@@ -3308,10 +3312,12 @@
               <a:prstGeom prst="ellipse">
                 <a:avLst/>
               </a:prstGeom>
-              <a:grpFill/>
+              <a:solidFill>
+                <a:srgbClr val="008000"/>
+              </a:solidFill>
               <a:ln w="3175" cmpd="sng">
                 <a:solidFill>
-                  <a:schemeClr val="accent2"/>
+                  <a:srgbClr val="008000"/>
                 </a:solidFill>
               </a:ln>
             </p:spPr>
@@ -4085,7 +4091,7 @@
               </a:custGeom>
               <a:ln w="38100" cmpd="sng">
                 <a:solidFill>
-                  <a:schemeClr val="accent2"/>
+                  <a:srgbClr val="008000"/>
                 </a:solidFill>
               </a:ln>
             </p:spPr>
@@ -4147,11 +4153,11 @@
                   <a:avLst/>
                 </a:prstGeom>
                 <a:solidFill>
-                  <a:srgbClr val="C0504D"/>
+                  <a:srgbClr val="008000"/>
                 </a:solidFill>
                 <a:ln w="3175" cmpd="sng">
                   <a:solidFill>
-                    <a:schemeClr val="accent2"/>
+                    <a:srgbClr val="008000"/>
                   </a:solidFill>
                 </a:ln>
               </p:spPr>
@@ -4198,11 +4204,11 @@
                   <a:avLst/>
                 </a:prstGeom>
                 <a:solidFill>
-                  <a:srgbClr val="C0504D"/>
+                  <a:srgbClr val="008000"/>
                 </a:solidFill>
                 <a:ln w="3175" cmpd="sng">
                   <a:solidFill>
-                    <a:schemeClr val="accent2"/>
+                    <a:srgbClr val="008000"/>
                   </a:solidFill>
                 </a:ln>
               </p:spPr>
@@ -4249,11 +4255,11 @@
                   <a:avLst/>
                 </a:prstGeom>
                 <a:solidFill>
-                  <a:srgbClr val="C0504D"/>
+                  <a:srgbClr val="008000"/>
                 </a:solidFill>
                 <a:ln w="3175" cmpd="sng">
                   <a:solidFill>
-                    <a:schemeClr val="accent2"/>
+                    <a:srgbClr val="008000"/>
                   </a:solidFill>
                 </a:ln>
               </p:spPr>
@@ -4300,11 +4306,11 @@
                   <a:avLst/>
                 </a:prstGeom>
                 <a:solidFill>
-                  <a:srgbClr val="C0504D"/>
+                  <a:srgbClr val="008000"/>
                 </a:solidFill>
                 <a:ln w="3175" cmpd="sng">
                   <a:solidFill>
-                    <a:schemeClr val="accent2"/>
+                    <a:srgbClr val="008000"/>
                   </a:solidFill>
                 </a:ln>
               </p:spPr>
@@ -6649,10 +6655,12 @@
                 <a:prstGeom prst="rect">
                   <a:avLst/>
                 </a:prstGeom>
-                <a:grpFill/>
+                <a:solidFill>
+                  <a:srgbClr val="008000"/>
+                </a:solidFill>
                 <a:ln w="3175" cmpd="sng">
                   <a:solidFill>
-                    <a:srgbClr val="C0504D"/>
+                    <a:srgbClr val="008000"/>
                   </a:solidFill>
                 </a:ln>
               </p:spPr>
@@ -6698,10 +6706,12 @@
                 <a:prstGeom prst="ellipse">
                   <a:avLst/>
                 </a:prstGeom>
-                <a:grpFill/>
+                <a:solidFill>
+                  <a:srgbClr val="008000"/>
+                </a:solidFill>
                 <a:ln w="3175" cmpd="sng">
                   <a:solidFill>
-                    <a:srgbClr val="C0504D"/>
+                    <a:srgbClr val="008000"/>
                   </a:solidFill>
                 </a:ln>
               </p:spPr>
@@ -6747,10 +6757,12 @@
                 <a:prstGeom prst="ellipse">
                   <a:avLst/>
                 </a:prstGeom>
-                <a:grpFill/>
+                <a:solidFill>
+                  <a:srgbClr val="008000"/>
+                </a:solidFill>
                 <a:ln w="3175" cmpd="sng">
                   <a:solidFill>
-                    <a:srgbClr val="C0504D"/>
+                    <a:srgbClr val="008000"/>
                   </a:solidFill>
                 </a:ln>
               </p:spPr>
@@ -6796,10 +6808,12 @@
                 <a:prstGeom prst="ellipse">
                   <a:avLst/>
                 </a:prstGeom>
-                <a:grpFill/>
+                <a:solidFill>
+                  <a:srgbClr val="008000"/>
+                </a:solidFill>
                 <a:ln w="3175" cmpd="sng">
                   <a:solidFill>
-                    <a:srgbClr val="C0504D"/>
+                    <a:srgbClr val="008000"/>
                   </a:solidFill>
                 </a:ln>
               </p:spPr>
@@ -7087,10 +7101,12 @@
                 <a:prstGeom prst="rect">
                   <a:avLst/>
                 </a:prstGeom>
-                <a:grpFill/>
+                <a:solidFill>
+                  <a:srgbClr val="008000"/>
+                </a:solidFill>
                 <a:ln w="3175" cmpd="sng">
                   <a:solidFill>
-                    <a:srgbClr val="C0504D"/>
+                    <a:srgbClr val="008000"/>
                   </a:solidFill>
                 </a:ln>
               </p:spPr>
@@ -7136,10 +7152,12 @@
                 <a:prstGeom prst="ellipse">
                   <a:avLst/>
                 </a:prstGeom>
-                <a:grpFill/>
+                <a:solidFill>
+                  <a:srgbClr val="008000"/>
+                </a:solidFill>
                 <a:ln w="3175" cmpd="sng">
                   <a:solidFill>
-                    <a:srgbClr val="C0504D"/>
+                    <a:srgbClr val="008000"/>
                   </a:solidFill>
                 </a:ln>
               </p:spPr>
@@ -7185,10 +7203,12 @@
                 <a:prstGeom prst="ellipse">
                   <a:avLst/>
                 </a:prstGeom>
-                <a:grpFill/>
+                <a:solidFill>
+                  <a:srgbClr val="008000"/>
+                </a:solidFill>
                 <a:ln w="3175" cmpd="sng">
                   <a:solidFill>
-                    <a:srgbClr val="C0504D"/>
+                    <a:srgbClr val="008000"/>
                   </a:solidFill>
                 </a:ln>
               </p:spPr>
@@ -7234,10 +7254,12 @@
                 <a:prstGeom prst="ellipse">
                   <a:avLst/>
                 </a:prstGeom>
-                <a:grpFill/>
+                <a:solidFill>
+                  <a:srgbClr val="008000"/>
+                </a:solidFill>
                 <a:ln w="3175" cmpd="sng">
                   <a:solidFill>
-                    <a:srgbClr val="C0504D"/>
+                    <a:srgbClr val="008000"/>
                   </a:solidFill>
                 </a:ln>
               </p:spPr>
@@ -7533,7 +7555,7 @@
               </a:custGeom>
               <a:ln w="38100" cmpd="sng">
                 <a:solidFill>
-                  <a:schemeClr val="accent2"/>
+                  <a:srgbClr val="008000"/>
                 </a:solidFill>
               </a:ln>
             </p:spPr>
@@ -7839,11 +7861,11 @@
                   <a:avLst/>
                 </a:prstGeom>
                 <a:solidFill>
-                  <a:srgbClr val="C0504D"/>
+                  <a:srgbClr val="008000"/>
                 </a:solidFill>
                 <a:ln w="3175" cmpd="sng">
                   <a:solidFill>
-                    <a:schemeClr val="accent2"/>
+                    <a:srgbClr val="008000"/>
                   </a:solidFill>
                 </a:ln>
               </p:spPr>
@@ -7890,11 +7912,11 @@
                   <a:avLst/>
                 </a:prstGeom>
                 <a:solidFill>
-                  <a:srgbClr val="C0504D"/>
+                  <a:srgbClr val="008000"/>
                 </a:solidFill>
                 <a:ln w="3175" cmpd="sng">
                   <a:solidFill>
-                    <a:schemeClr val="accent2"/>
+                    <a:srgbClr val="008000"/>
                   </a:solidFill>
                 </a:ln>
               </p:spPr>
@@ -7941,11 +7963,11 @@
                   <a:avLst/>
                 </a:prstGeom>
                 <a:solidFill>
-                  <a:srgbClr val="C0504D"/>
+                  <a:srgbClr val="008000"/>
                 </a:solidFill>
                 <a:ln w="3175" cmpd="sng">
                   <a:solidFill>
-                    <a:schemeClr val="accent2"/>
+                    <a:srgbClr val="008000"/>
                   </a:solidFill>
                 </a:ln>
               </p:spPr>
@@ -7992,11 +8014,11 @@
                   <a:avLst/>
                 </a:prstGeom>
                 <a:solidFill>
-                  <a:srgbClr val="C0504D"/>
+                  <a:srgbClr val="008000"/>
                 </a:solidFill>
                 <a:ln w="3175" cmpd="sng">
                   <a:solidFill>
-                    <a:schemeClr val="accent2"/>
+                    <a:srgbClr val="008000"/>
                   </a:solidFill>
                 </a:ln>
               </p:spPr>
@@ -8274,10 +8296,12 @@
                 <a:prstGeom prst="rect">
                   <a:avLst/>
                 </a:prstGeom>
-                <a:grpFill/>
+                <a:solidFill>
+                  <a:srgbClr val="008000"/>
+                </a:solidFill>
                 <a:ln w="3175" cmpd="sng">
                   <a:solidFill>
-                    <a:schemeClr val="accent2"/>
+                    <a:srgbClr val="008000"/>
                   </a:solidFill>
                 </a:ln>
               </p:spPr>
@@ -8323,10 +8347,12 @@
                 <a:prstGeom prst="ellipse">
                   <a:avLst/>
                 </a:prstGeom>
-                <a:grpFill/>
+                <a:solidFill>
+                  <a:srgbClr val="008000"/>
+                </a:solidFill>
                 <a:ln w="3175" cmpd="sng">
                   <a:solidFill>
-                    <a:schemeClr val="accent2"/>
+                    <a:srgbClr val="008000"/>
                   </a:solidFill>
                 </a:ln>
               </p:spPr>
@@ -8372,10 +8398,12 @@
                 <a:prstGeom prst="ellipse">
                   <a:avLst/>
                 </a:prstGeom>
-                <a:grpFill/>
+                <a:solidFill>
+                  <a:srgbClr val="008000"/>
+                </a:solidFill>
                 <a:ln w="3175" cmpd="sng">
                   <a:solidFill>
-                    <a:schemeClr val="accent2"/>
+                    <a:srgbClr val="008000"/>
                   </a:solidFill>
                 </a:ln>
               </p:spPr>
@@ -8421,10 +8449,12 @@
                 <a:prstGeom prst="ellipse">
                   <a:avLst/>
                 </a:prstGeom>
-                <a:grpFill/>
+                <a:solidFill>
+                  <a:srgbClr val="008000"/>
+                </a:solidFill>
                 <a:ln w="3175" cmpd="sng">
                   <a:solidFill>
-                    <a:schemeClr val="accent2"/>
+                    <a:srgbClr val="008000"/>
                   </a:solidFill>
                 </a:ln>
               </p:spPr>
@@ -11073,15 +11103,11 @@
                   </a:avLst>
                 </a:prstGeom>
                 <a:solidFill>
-                  <a:schemeClr val="bg1">
-                    <a:lumMod val="65000"/>
-                  </a:schemeClr>
+                  <a:srgbClr val="FF6600"/>
                 </a:solidFill>
                 <a:ln>
                   <a:solidFill>
-                    <a:schemeClr val="bg1">
-                      <a:lumMod val="65000"/>
-                    </a:schemeClr>
+                    <a:srgbClr val="FF6600"/>
                   </a:solidFill>
                 </a:ln>
               </p:spPr>
@@ -11187,11 +11213,11 @@
                   </a:avLst>
                 </a:prstGeom>
                 <a:solidFill>
-                  <a:schemeClr val="accent2"/>
+                  <a:srgbClr val="008000"/>
                 </a:solidFill>
                 <a:ln>
                   <a:solidFill>
-                    <a:schemeClr val="accent2"/>
+                    <a:srgbClr val="008000"/>
                   </a:solidFill>
                 </a:ln>
               </p:spPr>
@@ -22875,10 +22901,6 @@
                     </a:rPr>
                     <a:t>hort infection, sequencing</a:t>
                   </a:r>
-                  <a:endParaRPr lang="en-US" sz="1200" b="1" dirty="0" smtClean="0">
-                    <a:latin typeface="Arial"/>
-                    <a:cs typeface="Arial"/>
-                  </a:endParaRPr>
                 </a:p>
               </p:txBody>
             </p:sp>

</xml_diff>